<commit_message>
Mockups in Präsentation eingefügt
</commit_message>
<xml_diff>
--- a/assets/Zwischenpräsentation CH.pptx
+++ b/assets/Zwischenpräsentation CH.pptx
@@ -139,7 +139,7 @@
           <p:cNvPr id="2" name="Titel 1">
             <a:extLst>
               <a:ext uri="{FF2B5EF4-FFF2-40B4-BE49-F238E27FC236}">
-                <a16:creationId xmlns:a16="http://schemas.microsoft.com/office/drawing/2014/main" id="{749852C9-6766-40F6-A76A-1823904D0632}"/>
+                <a16:creationId xmlns:a16="http://schemas.microsoft.com/office/drawing/2014/main" xmlns="" id="{749852C9-6766-40F6-A76A-1823904D0632}"/>
               </a:ext>
             </a:extLst>
           </p:cNvPr>
@@ -176,7 +176,7 @@
           <p:cNvPr id="3" name="Untertitel 2">
             <a:extLst>
               <a:ext uri="{FF2B5EF4-FFF2-40B4-BE49-F238E27FC236}">
-                <a16:creationId xmlns:a16="http://schemas.microsoft.com/office/drawing/2014/main" id="{84696DF9-9E3C-4175-87B4-F40B284B642A}"/>
+                <a16:creationId xmlns:a16="http://schemas.microsoft.com/office/drawing/2014/main" xmlns="" id="{84696DF9-9E3C-4175-87B4-F40B284B642A}"/>
               </a:ext>
             </a:extLst>
           </p:cNvPr>
@@ -246,7 +246,7 @@
           <p:cNvPr id="4" name="Datumsplatzhalter 3">
             <a:extLst>
               <a:ext uri="{FF2B5EF4-FFF2-40B4-BE49-F238E27FC236}">
-                <a16:creationId xmlns:a16="http://schemas.microsoft.com/office/drawing/2014/main" id="{22A8C0FF-0B1D-4155-B49C-372CF1098338}"/>
+                <a16:creationId xmlns:a16="http://schemas.microsoft.com/office/drawing/2014/main" xmlns="" id="{22A8C0FF-0B1D-4155-B49C-372CF1098338}"/>
               </a:ext>
             </a:extLst>
           </p:cNvPr>
@@ -275,7 +275,7 @@
           <p:cNvPr id="5" name="Fußzeilenplatzhalter 4">
             <a:extLst>
               <a:ext uri="{FF2B5EF4-FFF2-40B4-BE49-F238E27FC236}">
-                <a16:creationId xmlns:a16="http://schemas.microsoft.com/office/drawing/2014/main" id="{859C3D7A-4FCE-4082-9C5D-B1824B145A16}"/>
+                <a16:creationId xmlns:a16="http://schemas.microsoft.com/office/drawing/2014/main" xmlns="" id="{859C3D7A-4FCE-4082-9C5D-B1824B145A16}"/>
               </a:ext>
             </a:extLst>
           </p:cNvPr>
@@ -300,7 +300,7 @@
           <p:cNvPr id="6" name="Foliennummernplatzhalter 5">
             <a:extLst>
               <a:ext uri="{FF2B5EF4-FFF2-40B4-BE49-F238E27FC236}">
-                <a16:creationId xmlns:a16="http://schemas.microsoft.com/office/drawing/2014/main" id="{2CB829E3-DD1B-4200-AD0E-6CF1409A33DF}"/>
+                <a16:creationId xmlns:a16="http://schemas.microsoft.com/office/drawing/2014/main" xmlns="" id="{2CB829E3-DD1B-4200-AD0E-6CF1409A33DF}"/>
               </a:ext>
             </a:extLst>
           </p:cNvPr>
@@ -359,7 +359,7 @@
           <p:cNvPr id="2" name="Titel 1">
             <a:extLst>
               <a:ext uri="{FF2B5EF4-FFF2-40B4-BE49-F238E27FC236}">
-                <a16:creationId xmlns:a16="http://schemas.microsoft.com/office/drawing/2014/main" id="{20408729-4FE7-4F3B-A187-C3202D9A7887}"/>
+                <a16:creationId xmlns:a16="http://schemas.microsoft.com/office/drawing/2014/main" xmlns="" id="{20408729-4FE7-4F3B-A187-C3202D9A7887}"/>
               </a:ext>
             </a:extLst>
           </p:cNvPr>
@@ -387,7 +387,7 @@
           <p:cNvPr id="3" name="Vertikaler Textplatzhalter 2">
             <a:extLst>
               <a:ext uri="{FF2B5EF4-FFF2-40B4-BE49-F238E27FC236}">
-                <a16:creationId xmlns:a16="http://schemas.microsoft.com/office/drawing/2014/main" id="{E4C61A44-25D7-4581-B2D5-08BE2035A5E0}"/>
+                <a16:creationId xmlns:a16="http://schemas.microsoft.com/office/drawing/2014/main" xmlns="" id="{E4C61A44-25D7-4581-B2D5-08BE2035A5E0}"/>
               </a:ext>
             </a:extLst>
           </p:cNvPr>
@@ -444,7 +444,7 @@
           <p:cNvPr id="4" name="Datumsplatzhalter 3">
             <a:extLst>
               <a:ext uri="{FF2B5EF4-FFF2-40B4-BE49-F238E27FC236}">
-                <a16:creationId xmlns:a16="http://schemas.microsoft.com/office/drawing/2014/main" id="{2FC1FB87-FE7A-4046-A06A-86109B44BEE5}"/>
+                <a16:creationId xmlns:a16="http://schemas.microsoft.com/office/drawing/2014/main" xmlns="" id="{2FC1FB87-FE7A-4046-A06A-86109B44BEE5}"/>
               </a:ext>
             </a:extLst>
           </p:cNvPr>
@@ -473,7 +473,7 @@
           <p:cNvPr id="5" name="Fußzeilenplatzhalter 4">
             <a:extLst>
               <a:ext uri="{FF2B5EF4-FFF2-40B4-BE49-F238E27FC236}">
-                <a16:creationId xmlns:a16="http://schemas.microsoft.com/office/drawing/2014/main" id="{31322ABB-364D-4334-A0C4-577F5CC7DA09}"/>
+                <a16:creationId xmlns:a16="http://schemas.microsoft.com/office/drawing/2014/main" xmlns="" id="{31322ABB-364D-4334-A0C4-577F5CC7DA09}"/>
               </a:ext>
             </a:extLst>
           </p:cNvPr>
@@ -498,7 +498,7 @@
           <p:cNvPr id="6" name="Foliennummernplatzhalter 5">
             <a:extLst>
               <a:ext uri="{FF2B5EF4-FFF2-40B4-BE49-F238E27FC236}">
-                <a16:creationId xmlns:a16="http://schemas.microsoft.com/office/drawing/2014/main" id="{B5348174-1B48-4465-BDF7-E5C24D2F0A15}"/>
+                <a16:creationId xmlns:a16="http://schemas.microsoft.com/office/drawing/2014/main" xmlns="" id="{B5348174-1B48-4465-BDF7-E5C24D2F0A15}"/>
               </a:ext>
             </a:extLst>
           </p:cNvPr>
@@ -557,7 +557,7 @@
           <p:cNvPr id="2" name="Vertikaler Titel 1">
             <a:extLst>
               <a:ext uri="{FF2B5EF4-FFF2-40B4-BE49-F238E27FC236}">
-                <a16:creationId xmlns:a16="http://schemas.microsoft.com/office/drawing/2014/main" id="{FE9F0434-B03A-46F6-A67B-A86B80F4CF97}"/>
+                <a16:creationId xmlns:a16="http://schemas.microsoft.com/office/drawing/2014/main" xmlns="" id="{FE9F0434-B03A-46F6-A67B-A86B80F4CF97}"/>
               </a:ext>
             </a:extLst>
           </p:cNvPr>
@@ -590,7 +590,7 @@
           <p:cNvPr id="3" name="Vertikaler Textplatzhalter 2">
             <a:extLst>
               <a:ext uri="{FF2B5EF4-FFF2-40B4-BE49-F238E27FC236}">
-                <a16:creationId xmlns:a16="http://schemas.microsoft.com/office/drawing/2014/main" id="{5E814769-B276-4D45-AC35-8FEFA148E70B}"/>
+                <a16:creationId xmlns:a16="http://schemas.microsoft.com/office/drawing/2014/main" xmlns="" id="{5E814769-B276-4D45-AC35-8FEFA148E70B}"/>
               </a:ext>
             </a:extLst>
           </p:cNvPr>
@@ -652,7 +652,7 @@
           <p:cNvPr id="4" name="Datumsplatzhalter 3">
             <a:extLst>
               <a:ext uri="{FF2B5EF4-FFF2-40B4-BE49-F238E27FC236}">
-                <a16:creationId xmlns:a16="http://schemas.microsoft.com/office/drawing/2014/main" id="{9EAF7671-1FE1-4A54-89C0-79145E08AAC6}"/>
+                <a16:creationId xmlns:a16="http://schemas.microsoft.com/office/drawing/2014/main" xmlns="" id="{9EAF7671-1FE1-4A54-89C0-79145E08AAC6}"/>
               </a:ext>
             </a:extLst>
           </p:cNvPr>
@@ -681,7 +681,7 @@
           <p:cNvPr id="5" name="Fußzeilenplatzhalter 4">
             <a:extLst>
               <a:ext uri="{FF2B5EF4-FFF2-40B4-BE49-F238E27FC236}">
-                <a16:creationId xmlns:a16="http://schemas.microsoft.com/office/drawing/2014/main" id="{0ECB2645-CC4D-4C9F-BCF4-499E65CA6AD4}"/>
+                <a16:creationId xmlns:a16="http://schemas.microsoft.com/office/drawing/2014/main" xmlns="" id="{0ECB2645-CC4D-4C9F-BCF4-499E65CA6AD4}"/>
               </a:ext>
             </a:extLst>
           </p:cNvPr>
@@ -706,7 +706,7 @@
           <p:cNvPr id="6" name="Foliennummernplatzhalter 5">
             <a:extLst>
               <a:ext uri="{FF2B5EF4-FFF2-40B4-BE49-F238E27FC236}">
-                <a16:creationId xmlns:a16="http://schemas.microsoft.com/office/drawing/2014/main" id="{79770A41-E211-4A28-856D-B48BCA6DD7F5}"/>
+                <a16:creationId xmlns:a16="http://schemas.microsoft.com/office/drawing/2014/main" xmlns="" id="{79770A41-E211-4A28-856D-B48BCA6DD7F5}"/>
               </a:ext>
             </a:extLst>
           </p:cNvPr>
@@ -765,7 +765,7 @@
           <p:cNvPr id="2" name="Titel 1">
             <a:extLst>
               <a:ext uri="{FF2B5EF4-FFF2-40B4-BE49-F238E27FC236}">
-                <a16:creationId xmlns:a16="http://schemas.microsoft.com/office/drawing/2014/main" id="{01ABC3D0-A9A2-4E67-A360-675E655C1C91}"/>
+                <a16:creationId xmlns:a16="http://schemas.microsoft.com/office/drawing/2014/main" xmlns="" id="{01ABC3D0-A9A2-4E67-A360-675E655C1C91}"/>
               </a:ext>
             </a:extLst>
           </p:cNvPr>
@@ -793,7 +793,7 @@
           <p:cNvPr id="3" name="Inhaltsplatzhalter 2">
             <a:extLst>
               <a:ext uri="{FF2B5EF4-FFF2-40B4-BE49-F238E27FC236}">
-                <a16:creationId xmlns:a16="http://schemas.microsoft.com/office/drawing/2014/main" id="{9697AA13-4A14-428C-89BD-1F99C4A37B67}"/>
+                <a16:creationId xmlns:a16="http://schemas.microsoft.com/office/drawing/2014/main" xmlns="" id="{9697AA13-4A14-428C-89BD-1F99C4A37B67}"/>
               </a:ext>
             </a:extLst>
           </p:cNvPr>
@@ -850,7 +850,7 @@
           <p:cNvPr id="4" name="Datumsplatzhalter 3">
             <a:extLst>
               <a:ext uri="{FF2B5EF4-FFF2-40B4-BE49-F238E27FC236}">
-                <a16:creationId xmlns:a16="http://schemas.microsoft.com/office/drawing/2014/main" id="{78571E9B-70FB-49F3-8FD7-8709E6540CD5}"/>
+                <a16:creationId xmlns:a16="http://schemas.microsoft.com/office/drawing/2014/main" xmlns="" id="{78571E9B-70FB-49F3-8FD7-8709E6540CD5}"/>
               </a:ext>
             </a:extLst>
           </p:cNvPr>
@@ -879,7 +879,7 @@
           <p:cNvPr id="5" name="Fußzeilenplatzhalter 4">
             <a:extLst>
               <a:ext uri="{FF2B5EF4-FFF2-40B4-BE49-F238E27FC236}">
-                <a16:creationId xmlns:a16="http://schemas.microsoft.com/office/drawing/2014/main" id="{62D44215-0D81-4239-8A9B-EAC595B16DD1}"/>
+                <a16:creationId xmlns:a16="http://schemas.microsoft.com/office/drawing/2014/main" xmlns="" id="{62D44215-0D81-4239-8A9B-EAC595B16DD1}"/>
               </a:ext>
             </a:extLst>
           </p:cNvPr>
@@ -904,7 +904,7 @@
           <p:cNvPr id="6" name="Foliennummernplatzhalter 5">
             <a:extLst>
               <a:ext uri="{FF2B5EF4-FFF2-40B4-BE49-F238E27FC236}">
-                <a16:creationId xmlns:a16="http://schemas.microsoft.com/office/drawing/2014/main" id="{B1D3AE09-17BC-482A-AC00-A9E5D478D62B}"/>
+                <a16:creationId xmlns:a16="http://schemas.microsoft.com/office/drawing/2014/main" xmlns="" id="{B1D3AE09-17BC-482A-AC00-A9E5D478D62B}"/>
               </a:ext>
             </a:extLst>
           </p:cNvPr>
@@ -963,7 +963,7 @@
           <p:cNvPr id="2" name="Titel 1">
             <a:extLst>
               <a:ext uri="{FF2B5EF4-FFF2-40B4-BE49-F238E27FC236}">
-                <a16:creationId xmlns:a16="http://schemas.microsoft.com/office/drawing/2014/main" id="{CF9953CC-AF2D-45ED-804C-9DB34BB920E7}"/>
+                <a16:creationId xmlns:a16="http://schemas.microsoft.com/office/drawing/2014/main" xmlns="" id="{CF9953CC-AF2D-45ED-804C-9DB34BB920E7}"/>
               </a:ext>
             </a:extLst>
           </p:cNvPr>
@@ -1000,7 +1000,7 @@
           <p:cNvPr id="3" name="Textplatzhalter 2">
             <a:extLst>
               <a:ext uri="{FF2B5EF4-FFF2-40B4-BE49-F238E27FC236}">
-                <a16:creationId xmlns:a16="http://schemas.microsoft.com/office/drawing/2014/main" id="{BF7F2DE9-D678-4A1D-94B5-FA0E9E0B3006}"/>
+                <a16:creationId xmlns:a16="http://schemas.microsoft.com/office/drawing/2014/main" xmlns="" id="{BF7F2DE9-D678-4A1D-94B5-FA0E9E0B3006}"/>
               </a:ext>
             </a:extLst>
           </p:cNvPr>
@@ -1125,7 +1125,7 @@
           <p:cNvPr id="4" name="Datumsplatzhalter 3">
             <a:extLst>
               <a:ext uri="{FF2B5EF4-FFF2-40B4-BE49-F238E27FC236}">
-                <a16:creationId xmlns:a16="http://schemas.microsoft.com/office/drawing/2014/main" id="{5D8FF689-0E70-4FFE-80C6-CFDF7FFD5215}"/>
+                <a16:creationId xmlns:a16="http://schemas.microsoft.com/office/drawing/2014/main" xmlns="" id="{5D8FF689-0E70-4FFE-80C6-CFDF7FFD5215}"/>
               </a:ext>
             </a:extLst>
           </p:cNvPr>
@@ -1154,7 +1154,7 @@
           <p:cNvPr id="5" name="Fußzeilenplatzhalter 4">
             <a:extLst>
               <a:ext uri="{FF2B5EF4-FFF2-40B4-BE49-F238E27FC236}">
-                <a16:creationId xmlns:a16="http://schemas.microsoft.com/office/drawing/2014/main" id="{05208D7A-55E0-4798-8F89-265798037C9F}"/>
+                <a16:creationId xmlns:a16="http://schemas.microsoft.com/office/drawing/2014/main" xmlns="" id="{05208D7A-55E0-4798-8F89-265798037C9F}"/>
               </a:ext>
             </a:extLst>
           </p:cNvPr>
@@ -1179,7 +1179,7 @@
           <p:cNvPr id="6" name="Foliennummernplatzhalter 5">
             <a:extLst>
               <a:ext uri="{FF2B5EF4-FFF2-40B4-BE49-F238E27FC236}">
-                <a16:creationId xmlns:a16="http://schemas.microsoft.com/office/drawing/2014/main" id="{B521EA9F-B5F1-4F45-B945-234EBAD958D2}"/>
+                <a16:creationId xmlns:a16="http://schemas.microsoft.com/office/drawing/2014/main" xmlns="" id="{B521EA9F-B5F1-4F45-B945-234EBAD958D2}"/>
               </a:ext>
             </a:extLst>
           </p:cNvPr>
@@ -1238,7 +1238,7 @@
           <p:cNvPr id="2" name="Titel 1">
             <a:extLst>
               <a:ext uri="{FF2B5EF4-FFF2-40B4-BE49-F238E27FC236}">
-                <a16:creationId xmlns:a16="http://schemas.microsoft.com/office/drawing/2014/main" id="{4D7D0C0A-326E-42F4-AD94-A52C6E0CBC24}"/>
+                <a16:creationId xmlns:a16="http://schemas.microsoft.com/office/drawing/2014/main" xmlns="" id="{4D7D0C0A-326E-42F4-AD94-A52C6E0CBC24}"/>
               </a:ext>
             </a:extLst>
           </p:cNvPr>
@@ -1266,7 +1266,7 @@
           <p:cNvPr id="3" name="Inhaltsplatzhalter 2">
             <a:extLst>
               <a:ext uri="{FF2B5EF4-FFF2-40B4-BE49-F238E27FC236}">
-                <a16:creationId xmlns:a16="http://schemas.microsoft.com/office/drawing/2014/main" id="{6F03BB3B-FFDF-4BA4-8E57-DACC157C6135}"/>
+                <a16:creationId xmlns:a16="http://schemas.microsoft.com/office/drawing/2014/main" xmlns="" id="{6F03BB3B-FFDF-4BA4-8E57-DACC157C6135}"/>
               </a:ext>
             </a:extLst>
           </p:cNvPr>
@@ -1328,7 +1328,7 @@
           <p:cNvPr id="4" name="Inhaltsplatzhalter 3">
             <a:extLst>
               <a:ext uri="{FF2B5EF4-FFF2-40B4-BE49-F238E27FC236}">
-                <a16:creationId xmlns:a16="http://schemas.microsoft.com/office/drawing/2014/main" id="{D6D4CE00-0234-41A3-B192-A824FAEA2418}"/>
+                <a16:creationId xmlns:a16="http://schemas.microsoft.com/office/drawing/2014/main" xmlns="" id="{D6D4CE00-0234-41A3-B192-A824FAEA2418}"/>
               </a:ext>
             </a:extLst>
           </p:cNvPr>
@@ -1390,7 +1390,7 @@
           <p:cNvPr id="5" name="Datumsplatzhalter 4">
             <a:extLst>
               <a:ext uri="{FF2B5EF4-FFF2-40B4-BE49-F238E27FC236}">
-                <a16:creationId xmlns:a16="http://schemas.microsoft.com/office/drawing/2014/main" id="{66922E38-E20D-4B79-8A52-58F8A21B34E0}"/>
+                <a16:creationId xmlns:a16="http://schemas.microsoft.com/office/drawing/2014/main" xmlns="" id="{66922E38-E20D-4B79-8A52-58F8A21B34E0}"/>
               </a:ext>
             </a:extLst>
           </p:cNvPr>
@@ -1419,7 +1419,7 @@
           <p:cNvPr id="6" name="Fußzeilenplatzhalter 5">
             <a:extLst>
               <a:ext uri="{FF2B5EF4-FFF2-40B4-BE49-F238E27FC236}">
-                <a16:creationId xmlns:a16="http://schemas.microsoft.com/office/drawing/2014/main" id="{415784A4-4B8F-4C15-8604-81A9C0C1DF74}"/>
+                <a16:creationId xmlns:a16="http://schemas.microsoft.com/office/drawing/2014/main" xmlns="" id="{415784A4-4B8F-4C15-8604-81A9C0C1DF74}"/>
               </a:ext>
             </a:extLst>
           </p:cNvPr>
@@ -1444,7 +1444,7 @@
           <p:cNvPr id="7" name="Foliennummernplatzhalter 6">
             <a:extLst>
               <a:ext uri="{FF2B5EF4-FFF2-40B4-BE49-F238E27FC236}">
-                <a16:creationId xmlns:a16="http://schemas.microsoft.com/office/drawing/2014/main" id="{C6E78758-3222-4D07-99E8-90C511E4952D}"/>
+                <a16:creationId xmlns:a16="http://schemas.microsoft.com/office/drawing/2014/main" xmlns="" id="{C6E78758-3222-4D07-99E8-90C511E4952D}"/>
               </a:ext>
             </a:extLst>
           </p:cNvPr>
@@ -1503,7 +1503,7 @@
           <p:cNvPr id="2" name="Titel 1">
             <a:extLst>
               <a:ext uri="{FF2B5EF4-FFF2-40B4-BE49-F238E27FC236}">
-                <a16:creationId xmlns:a16="http://schemas.microsoft.com/office/drawing/2014/main" id="{266C159D-B675-441B-B436-5E98B13279DC}"/>
+                <a16:creationId xmlns:a16="http://schemas.microsoft.com/office/drawing/2014/main" xmlns="" id="{266C159D-B675-441B-B436-5E98B13279DC}"/>
               </a:ext>
             </a:extLst>
           </p:cNvPr>
@@ -1536,7 +1536,7 @@
           <p:cNvPr id="3" name="Textplatzhalter 2">
             <a:extLst>
               <a:ext uri="{FF2B5EF4-FFF2-40B4-BE49-F238E27FC236}">
-                <a16:creationId xmlns:a16="http://schemas.microsoft.com/office/drawing/2014/main" id="{5EAD995C-2D38-4568-B4BB-184107954169}"/>
+                <a16:creationId xmlns:a16="http://schemas.microsoft.com/office/drawing/2014/main" xmlns="" id="{5EAD995C-2D38-4568-B4BB-184107954169}"/>
               </a:ext>
             </a:extLst>
           </p:cNvPr>
@@ -1607,7 +1607,7 @@
           <p:cNvPr id="4" name="Inhaltsplatzhalter 3">
             <a:extLst>
               <a:ext uri="{FF2B5EF4-FFF2-40B4-BE49-F238E27FC236}">
-                <a16:creationId xmlns:a16="http://schemas.microsoft.com/office/drawing/2014/main" id="{202D1B48-1F0E-4EBC-B7C0-37F939AF5FFE}"/>
+                <a16:creationId xmlns:a16="http://schemas.microsoft.com/office/drawing/2014/main" xmlns="" id="{202D1B48-1F0E-4EBC-B7C0-37F939AF5FFE}"/>
               </a:ext>
             </a:extLst>
           </p:cNvPr>
@@ -1669,7 +1669,7 @@
           <p:cNvPr id="5" name="Textplatzhalter 4">
             <a:extLst>
               <a:ext uri="{FF2B5EF4-FFF2-40B4-BE49-F238E27FC236}">
-                <a16:creationId xmlns:a16="http://schemas.microsoft.com/office/drawing/2014/main" id="{2586D757-E16D-4FDB-ADBB-83E453E9D595}"/>
+                <a16:creationId xmlns:a16="http://schemas.microsoft.com/office/drawing/2014/main" xmlns="" id="{2586D757-E16D-4FDB-ADBB-83E453E9D595}"/>
               </a:ext>
             </a:extLst>
           </p:cNvPr>
@@ -1740,7 +1740,7 @@
           <p:cNvPr id="6" name="Inhaltsplatzhalter 5">
             <a:extLst>
               <a:ext uri="{FF2B5EF4-FFF2-40B4-BE49-F238E27FC236}">
-                <a16:creationId xmlns:a16="http://schemas.microsoft.com/office/drawing/2014/main" id="{45F34C61-A1ED-4475-B11E-A4D6DD469960}"/>
+                <a16:creationId xmlns:a16="http://schemas.microsoft.com/office/drawing/2014/main" xmlns="" id="{45F34C61-A1ED-4475-B11E-A4D6DD469960}"/>
               </a:ext>
             </a:extLst>
           </p:cNvPr>
@@ -1802,7 +1802,7 @@
           <p:cNvPr id="7" name="Datumsplatzhalter 6">
             <a:extLst>
               <a:ext uri="{FF2B5EF4-FFF2-40B4-BE49-F238E27FC236}">
-                <a16:creationId xmlns:a16="http://schemas.microsoft.com/office/drawing/2014/main" id="{07D51B86-67AB-4BE6-8BA7-D254888171B3}"/>
+                <a16:creationId xmlns:a16="http://schemas.microsoft.com/office/drawing/2014/main" xmlns="" id="{07D51B86-67AB-4BE6-8BA7-D254888171B3}"/>
               </a:ext>
             </a:extLst>
           </p:cNvPr>
@@ -1831,7 +1831,7 @@
           <p:cNvPr id="8" name="Fußzeilenplatzhalter 7">
             <a:extLst>
               <a:ext uri="{FF2B5EF4-FFF2-40B4-BE49-F238E27FC236}">
-                <a16:creationId xmlns:a16="http://schemas.microsoft.com/office/drawing/2014/main" id="{90CB3AF4-94E6-4A4E-B6BC-D3DD554ECDB4}"/>
+                <a16:creationId xmlns:a16="http://schemas.microsoft.com/office/drawing/2014/main" xmlns="" id="{90CB3AF4-94E6-4A4E-B6BC-D3DD554ECDB4}"/>
               </a:ext>
             </a:extLst>
           </p:cNvPr>
@@ -1856,7 +1856,7 @@
           <p:cNvPr id="9" name="Foliennummernplatzhalter 8">
             <a:extLst>
               <a:ext uri="{FF2B5EF4-FFF2-40B4-BE49-F238E27FC236}">
-                <a16:creationId xmlns:a16="http://schemas.microsoft.com/office/drawing/2014/main" id="{0712711E-3A93-4D9A-8FFE-8E2757DB1F67}"/>
+                <a16:creationId xmlns:a16="http://schemas.microsoft.com/office/drawing/2014/main" xmlns="" id="{0712711E-3A93-4D9A-8FFE-8E2757DB1F67}"/>
               </a:ext>
             </a:extLst>
           </p:cNvPr>
@@ -1915,7 +1915,7 @@
           <p:cNvPr id="2" name="Titel 1">
             <a:extLst>
               <a:ext uri="{FF2B5EF4-FFF2-40B4-BE49-F238E27FC236}">
-                <a16:creationId xmlns:a16="http://schemas.microsoft.com/office/drawing/2014/main" id="{79CB0853-9117-44EF-9036-5F692FBA867B}"/>
+                <a16:creationId xmlns:a16="http://schemas.microsoft.com/office/drawing/2014/main" xmlns="" id="{79CB0853-9117-44EF-9036-5F692FBA867B}"/>
               </a:ext>
             </a:extLst>
           </p:cNvPr>
@@ -1943,7 +1943,7 @@
           <p:cNvPr id="3" name="Datumsplatzhalter 2">
             <a:extLst>
               <a:ext uri="{FF2B5EF4-FFF2-40B4-BE49-F238E27FC236}">
-                <a16:creationId xmlns:a16="http://schemas.microsoft.com/office/drawing/2014/main" id="{145709F5-67DA-4975-8386-C59B80B8A8A8}"/>
+                <a16:creationId xmlns:a16="http://schemas.microsoft.com/office/drawing/2014/main" xmlns="" id="{145709F5-67DA-4975-8386-C59B80B8A8A8}"/>
               </a:ext>
             </a:extLst>
           </p:cNvPr>
@@ -1972,7 +1972,7 @@
           <p:cNvPr id="4" name="Fußzeilenplatzhalter 3">
             <a:extLst>
               <a:ext uri="{FF2B5EF4-FFF2-40B4-BE49-F238E27FC236}">
-                <a16:creationId xmlns:a16="http://schemas.microsoft.com/office/drawing/2014/main" id="{A58CA182-0174-4425-AA14-CE21DE508906}"/>
+                <a16:creationId xmlns:a16="http://schemas.microsoft.com/office/drawing/2014/main" xmlns="" id="{A58CA182-0174-4425-AA14-CE21DE508906}"/>
               </a:ext>
             </a:extLst>
           </p:cNvPr>
@@ -1997,7 +1997,7 @@
           <p:cNvPr id="5" name="Foliennummernplatzhalter 4">
             <a:extLst>
               <a:ext uri="{FF2B5EF4-FFF2-40B4-BE49-F238E27FC236}">
-                <a16:creationId xmlns:a16="http://schemas.microsoft.com/office/drawing/2014/main" id="{A02EF08E-3EFC-4452-8CE6-0A04EF5A7A12}"/>
+                <a16:creationId xmlns:a16="http://schemas.microsoft.com/office/drawing/2014/main" xmlns="" id="{A02EF08E-3EFC-4452-8CE6-0A04EF5A7A12}"/>
               </a:ext>
             </a:extLst>
           </p:cNvPr>
@@ -2056,7 +2056,7 @@
           <p:cNvPr id="2" name="Datumsplatzhalter 1">
             <a:extLst>
               <a:ext uri="{FF2B5EF4-FFF2-40B4-BE49-F238E27FC236}">
-                <a16:creationId xmlns:a16="http://schemas.microsoft.com/office/drawing/2014/main" id="{DCAD8910-BA4B-40EA-B408-B6530932A0AF}"/>
+                <a16:creationId xmlns:a16="http://schemas.microsoft.com/office/drawing/2014/main" xmlns="" id="{DCAD8910-BA4B-40EA-B408-B6530932A0AF}"/>
               </a:ext>
             </a:extLst>
           </p:cNvPr>
@@ -2085,7 +2085,7 @@
           <p:cNvPr id="3" name="Fußzeilenplatzhalter 2">
             <a:extLst>
               <a:ext uri="{FF2B5EF4-FFF2-40B4-BE49-F238E27FC236}">
-                <a16:creationId xmlns:a16="http://schemas.microsoft.com/office/drawing/2014/main" id="{2CEFC895-DD25-4054-A0B1-6FE086192BEC}"/>
+                <a16:creationId xmlns:a16="http://schemas.microsoft.com/office/drawing/2014/main" xmlns="" id="{2CEFC895-DD25-4054-A0B1-6FE086192BEC}"/>
               </a:ext>
             </a:extLst>
           </p:cNvPr>
@@ -2110,7 +2110,7 @@
           <p:cNvPr id="4" name="Foliennummernplatzhalter 3">
             <a:extLst>
               <a:ext uri="{FF2B5EF4-FFF2-40B4-BE49-F238E27FC236}">
-                <a16:creationId xmlns:a16="http://schemas.microsoft.com/office/drawing/2014/main" id="{C62B1C5F-101E-4692-BE93-F348A868B647}"/>
+                <a16:creationId xmlns:a16="http://schemas.microsoft.com/office/drawing/2014/main" xmlns="" id="{C62B1C5F-101E-4692-BE93-F348A868B647}"/>
               </a:ext>
             </a:extLst>
           </p:cNvPr>
@@ -2169,7 +2169,7 @@
           <p:cNvPr id="2" name="Titel 1">
             <a:extLst>
               <a:ext uri="{FF2B5EF4-FFF2-40B4-BE49-F238E27FC236}">
-                <a16:creationId xmlns:a16="http://schemas.microsoft.com/office/drawing/2014/main" id="{D4C9A2BA-51DC-4C7F-BFEE-7E977C6C0080}"/>
+                <a16:creationId xmlns:a16="http://schemas.microsoft.com/office/drawing/2014/main" xmlns="" id="{D4C9A2BA-51DC-4C7F-BFEE-7E977C6C0080}"/>
               </a:ext>
             </a:extLst>
           </p:cNvPr>
@@ -2206,7 +2206,7 @@
           <p:cNvPr id="3" name="Inhaltsplatzhalter 2">
             <a:extLst>
               <a:ext uri="{FF2B5EF4-FFF2-40B4-BE49-F238E27FC236}">
-                <a16:creationId xmlns:a16="http://schemas.microsoft.com/office/drawing/2014/main" id="{F5584F75-D77D-4666-B1FC-7711B721E0C2}"/>
+                <a16:creationId xmlns:a16="http://schemas.microsoft.com/office/drawing/2014/main" xmlns="" id="{F5584F75-D77D-4666-B1FC-7711B721E0C2}"/>
               </a:ext>
             </a:extLst>
           </p:cNvPr>
@@ -2296,7 +2296,7 @@
           <p:cNvPr id="4" name="Textplatzhalter 3">
             <a:extLst>
               <a:ext uri="{FF2B5EF4-FFF2-40B4-BE49-F238E27FC236}">
-                <a16:creationId xmlns:a16="http://schemas.microsoft.com/office/drawing/2014/main" id="{E3B6F105-4E0E-46A9-A847-89AE38B3E6D1}"/>
+                <a16:creationId xmlns:a16="http://schemas.microsoft.com/office/drawing/2014/main" xmlns="" id="{E3B6F105-4E0E-46A9-A847-89AE38B3E6D1}"/>
               </a:ext>
             </a:extLst>
           </p:cNvPr>
@@ -2367,7 +2367,7 @@
           <p:cNvPr id="5" name="Datumsplatzhalter 4">
             <a:extLst>
               <a:ext uri="{FF2B5EF4-FFF2-40B4-BE49-F238E27FC236}">
-                <a16:creationId xmlns:a16="http://schemas.microsoft.com/office/drawing/2014/main" id="{48D56900-1BF7-4D33-9D36-16F55D29FC6E}"/>
+                <a16:creationId xmlns:a16="http://schemas.microsoft.com/office/drawing/2014/main" xmlns="" id="{48D56900-1BF7-4D33-9D36-16F55D29FC6E}"/>
               </a:ext>
             </a:extLst>
           </p:cNvPr>
@@ -2396,7 +2396,7 @@
           <p:cNvPr id="6" name="Fußzeilenplatzhalter 5">
             <a:extLst>
               <a:ext uri="{FF2B5EF4-FFF2-40B4-BE49-F238E27FC236}">
-                <a16:creationId xmlns:a16="http://schemas.microsoft.com/office/drawing/2014/main" id="{1A7A2A42-6398-4FA3-B598-79193AB07A80}"/>
+                <a16:creationId xmlns:a16="http://schemas.microsoft.com/office/drawing/2014/main" xmlns="" id="{1A7A2A42-6398-4FA3-B598-79193AB07A80}"/>
               </a:ext>
             </a:extLst>
           </p:cNvPr>
@@ -2421,7 +2421,7 @@
           <p:cNvPr id="7" name="Foliennummernplatzhalter 6">
             <a:extLst>
               <a:ext uri="{FF2B5EF4-FFF2-40B4-BE49-F238E27FC236}">
-                <a16:creationId xmlns:a16="http://schemas.microsoft.com/office/drawing/2014/main" id="{726E82F1-820A-4AEE-82AF-F836B70666A4}"/>
+                <a16:creationId xmlns:a16="http://schemas.microsoft.com/office/drawing/2014/main" xmlns="" id="{726E82F1-820A-4AEE-82AF-F836B70666A4}"/>
               </a:ext>
             </a:extLst>
           </p:cNvPr>
@@ -2480,7 +2480,7 @@
           <p:cNvPr id="2" name="Titel 1">
             <a:extLst>
               <a:ext uri="{FF2B5EF4-FFF2-40B4-BE49-F238E27FC236}">
-                <a16:creationId xmlns:a16="http://schemas.microsoft.com/office/drawing/2014/main" id="{91B47CF9-120F-41E3-9490-CD89CC42EADB}"/>
+                <a16:creationId xmlns:a16="http://schemas.microsoft.com/office/drawing/2014/main" xmlns="" id="{91B47CF9-120F-41E3-9490-CD89CC42EADB}"/>
               </a:ext>
             </a:extLst>
           </p:cNvPr>
@@ -2517,7 +2517,7 @@
           <p:cNvPr id="3" name="Bildplatzhalter 2">
             <a:extLst>
               <a:ext uri="{FF2B5EF4-FFF2-40B4-BE49-F238E27FC236}">
-                <a16:creationId xmlns:a16="http://schemas.microsoft.com/office/drawing/2014/main" id="{BE762C8A-E1AF-473A-95E1-C862CA605C15}"/>
+                <a16:creationId xmlns:a16="http://schemas.microsoft.com/office/drawing/2014/main" xmlns="" id="{BE762C8A-E1AF-473A-95E1-C862CA605C15}"/>
               </a:ext>
             </a:extLst>
           </p:cNvPr>
@@ -2584,7 +2584,7 @@
           <p:cNvPr id="4" name="Textplatzhalter 3">
             <a:extLst>
               <a:ext uri="{FF2B5EF4-FFF2-40B4-BE49-F238E27FC236}">
-                <a16:creationId xmlns:a16="http://schemas.microsoft.com/office/drawing/2014/main" id="{3E20B71F-EB74-4102-95A1-53AC0DF8FB14}"/>
+                <a16:creationId xmlns:a16="http://schemas.microsoft.com/office/drawing/2014/main" xmlns="" id="{3E20B71F-EB74-4102-95A1-53AC0DF8FB14}"/>
               </a:ext>
             </a:extLst>
           </p:cNvPr>
@@ -2655,7 +2655,7 @@
           <p:cNvPr id="5" name="Datumsplatzhalter 4">
             <a:extLst>
               <a:ext uri="{FF2B5EF4-FFF2-40B4-BE49-F238E27FC236}">
-                <a16:creationId xmlns:a16="http://schemas.microsoft.com/office/drawing/2014/main" id="{2A18AC28-E07E-4D56-A30C-7B8F159393A9}"/>
+                <a16:creationId xmlns:a16="http://schemas.microsoft.com/office/drawing/2014/main" xmlns="" id="{2A18AC28-E07E-4D56-A30C-7B8F159393A9}"/>
               </a:ext>
             </a:extLst>
           </p:cNvPr>
@@ -2684,7 +2684,7 @@
           <p:cNvPr id="6" name="Fußzeilenplatzhalter 5">
             <a:extLst>
               <a:ext uri="{FF2B5EF4-FFF2-40B4-BE49-F238E27FC236}">
-                <a16:creationId xmlns:a16="http://schemas.microsoft.com/office/drawing/2014/main" id="{8AAD20C6-74DC-439C-BA20-240AE6C0E49B}"/>
+                <a16:creationId xmlns:a16="http://schemas.microsoft.com/office/drawing/2014/main" xmlns="" id="{8AAD20C6-74DC-439C-BA20-240AE6C0E49B}"/>
               </a:ext>
             </a:extLst>
           </p:cNvPr>
@@ -2709,7 +2709,7 @@
           <p:cNvPr id="7" name="Foliennummernplatzhalter 6">
             <a:extLst>
               <a:ext uri="{FF2B5EF4-FFF2-40B4-BE49-F238E27FC236}">
-                <a16:creationId xmlns:a16="http://schemas.microsoft.com/office/drawing/2014/main" id="{C464A28D-2088-4FDE-BD6A-4331D6124899}"/>
+                <a16:creationId xmlns:a16="http://schemas.microsoft.com/office/drawing/2014/main" xmlns="" id="{C464A28D-2088-4FDE-BD6A-4331D6124899}"/>
               </a:ext>
             </a:extLst>
           </p:cNvPr>
@@ -2773,7 +2773,7 @@
           <p:cNvPr id="2" name="Titelplatzhalter 1">
             <a:extLst>
               <a:ext uri="{FF2B5EF4-FFF2-40B4-BE49-F238E27FC236}">
-                <a16:creationId xmlns:a16="http://schemas.microsoft.com/office/drawing/2014/main" id="{F71C5E7D-69D6-42F1-A321-44D3F127C8E7}"/>
+                <a16:creationId xmlns:a16="http://schemas.microsoft.com/office/drawing/2014/main" xmlns="" id="{F71C5E7D-69D6-42F1-A321-44D3F127C8E7}"/>
               </a:ext>
             </a:extLst>
           </p:cNvPr>
@@ -2811,7 +2811,7 @@
           <p:cNvPr id="3" name="Textplatzhalter 2">
             <a:extLst>
               <a:ext uri="{FF2B5EF4-FFF2-40B4-BE49-F238E27FC236}">
-                <a16:creationId xmlns:a16="http://schemas.microsoft.com/office/drawing/2014/main" id="{1C97E5ED-2862-4EAB-B925-557E03E5CEF8}"/>
+                <a16:creationId xmlns:a16="http://schemas.microsoft.com/office/drawing/2014/main" xmlns="" id="{1C97E5ED-2862-4EAB-B925-557E03E5CEF8}"/>
               </a:ext>
             </a:extLst>
           </p:cNvPr>
@@ -2878,7 +2878,7 @@
           <p:cNvPr id="4" name="Datumsplatzhalter 3">
             <a:extLst>
               <a:ext uri="{FF2B5EF4-FFF2-40B4-BE49-F238E27FC236}">
-                <a16:creationId xmlns:a16="http://schemas.microsoft.com/office/drawing/2014/main" id="{E8F85EF0-AD19-450F-A3BD-9DAF2E6FF2CA}"/>
+                <a16:creationId xmlns:a16="http://schemas.microsoft.com/office/drawing/2014/main" xmlns="" id="{E8F85EF0-AD19-450F-A3BD-9DAF2E6FF2CA}"/>
               </a:ext>
             </a:extLst>
           </p:cNvPr>
@@ -2925,7 +2925,7 @@
           <p:cNvPr id="5" name="Fußzeilenplatzhalter 4">
             <a:extLst>
               <a:ext uri="{FF2B5EF4-FFF2-40B4-BE49-F238E27FC236}">
-                <a16:creationId xmlns:a16="http://schemas.microsoft.com/office/drawing/2014/main" id="{7293A5BD-EC44-45DE-AB05-0FF6BEE96393}"/>
+                <a16:creationId xmlns:a16="http://schemas.microsoft.com/office/drawing/2014/main" xmlns="" id="{7293A5BD-EC44-45DE-AB05-0FF6BEE96393}"/>
               </a:ext>
             </a:extLst>
           </p:cNvPr>
@@ -2968,7 +2968,7 @@
           <p:cNvPr id="6" name="Foliennummernplatzhalter 5">
             <a:extLst>
               <a:ext uri="{FF2B5EF4-FFF2-40B4-BE49-F238E27FC236}">
-                <a16:creationId xmlns:a16="http://schemas.microsoft.com/office/drawing/2014/main" id="{784C9FE9-D21F-4D9B-9E07-2B00F1E0E955}"/>
+                <a16:creationId xmlns:a16="http://schemas.microsoft.com/office/drawing/2014/main" xmlns="" id="{784C9FE9-D21F-4D9B-9E07-2B00F1E0E955}"/>
               </a:ext>
             </a:extLst>
           </p:cNvPr>
@@ -3336,7 +3336,7 @@
           <p:cNvPr id="2" name="Titel 1">
             <a:extLst>
               <a:ext uri="{FF2B5EF4-FFF2-40B4-BE49-F238E27FC236}">
-                <a16:creationId xmlns:a16="http://schemas.microsoft.com/office/drawing/2014/main" id="{05F99161-2719-443B-83DF-B35A3F5108CA}"/>
+                <a16:creationId xmlns:a16="http://schemas.microsoft.com/office/drawing/2014/main" xmlns="" id="{05F99161-2719-443B-83DF-B35A3F5108CA}"/>
               </a:ext>
             </a:extLst>
           </p:cNvPr>
@@ -3365,7 +3365,7 @@
           <p:cNvPr id="3" name="Untertitel 2">
             <a:extLst>
               <a:ext uri="{FF2B5EF4-FFF2-40B4-BE49-F238E27FC236}">
-                <a16:creationId xmlns:a16="http://schemas.microsoft.com/office/drawing/2014/main" id="{1BACD806-0FB6-4E15-8B7C-C34E643D5424}"/>
+                <a16:creationId xmlns:a16="http://schemas.microsoft.com/office/drawing/2014/main" xmlns="" id="{1BACD806-0FB6-4E15-8B7C-C34E643D5424}"/>
               </a:ext>
             </a:extLst>
           </p:cNvPr>
@@ -3406,7 +3406,7 @@
           <p:cNvPr id="5" name="Grafik 4">
             <a:extLst>
               <a:ext uri="{FF2B5EF4-FFF2-40B4-BE49-F238E27FC236}">
-                <a16:creationId xmlns:a16="http://schemas.microsoft.com/office/drawing/2014/main" id="{69990301-B26B-480C-9630-FE37F878E3AE}"/>
+                <a16:creationId xmlns:a16="http://schemas.microsoft.com/office/drawing/2014/main" xmlns="" id="{69990301-B26B-480C-9630-FE37F878E3AE}"/>
               </a:ext>
             </a:extLst>
           </p:cNvPr>
@@ -3416,7 +3416,7 @@
           <p:nvPr/>
         </p:nvPicPr>
         <p:blipFill>
-          <a:blip r:embed="rId2">
+          <a:blip r:embed="rId2" cstate="print">
             <a:extLst>
               <a:ext uri="{28A0092B-C50C-407E-A947-70E740481C1C}">
                 <a14:useLocalDpi xmlns:a14="http://schemas.microsoft.com/office/drawing/2010/main" val="0"/>
@@ -3447,6 +3447,13 @@
   <p:clrMapOvr>
     <a:masterClrMapping/>
   </p:clrMapOvr>
+  <p:timing>
+    <p:tnLst>
+      <p:par>
+        <p:cTn id="1" dur="indefinite" restart="never" nodeType="tmRoot"/>
+      </p:par>
+    </p:tnLst>
+  </p:timing>
 </p:sld>
 </file>
 
@@ -3472,7 +3479,7 @@
           <p:cNvPr id="2" name="Titel 1">
             <a:extLst>
               <a:ext uri="{FF2B5EF4-FFF2-40B4-BE49-F238E27FC236}">
-                <a16:creationId xmlns:a16="http://schemas.microsoft.com/office/drawing/2014/main" id="{C3FC66E5-1BC6-478E-AF30-99267E9E9707}"/>
+                <a16:creationId xmlns:a16="http://schemas.microsoft.com/office/drawing/2014/main" xmlns="" id="{C3FC66E5-1BC6-478E-AF30-99267E9E9707}"/>
               </a:ext>
             </a:extLst>
           </p:cNvPr>
@@ -3500,7 +3507,7 @@
           <p:cNvPr id="3" name="Inhaltsplatzhalter 2">
             <a:extLst>
               <a:ext uri="{FF2B5EF4-FFF2-40B4-BE49-F238E27FC236}">
-                <a16:creationId xmlns:a16="http://schemas.microsoft.com/office/drawing/2014/main" id="{F88D185D-F4BA-4E7C-B099-6405FECD2FC8}"/>
+                <a16:creationId xmlns:a16="http://schemas.microsoft.com/office/drawing/2014/main" xmlns="" id="{F88D185D-F4BA-4E7C-B099-6405FECD2FC8}"/>
               </a:ext>
             </a:extLst>
           </p:cNvPr>
@@ -3641,7 +3648,7 @@
           <p:cNvPr id="5" name="Grafik 4">
             <a:extLst>
               <a:ext uri="{FF2B5EF4-FFF2-40B4-BE49-F238E27FC236}">
-                <a16:creationId xmlns:a16="http://schemas.microsoft.com/office/drawing/2014/main" id="{C62B9CAB-8D8C-4124-B782-2C2B25AC3E67}"/>
+                <a16:creationId xmlns:a16="http://schemas.microsoft.com/office/drawing/2014/main" xmlns="" id="{C62B9CAB-8D8C-4124-B782-2C2B25AC3E67}"/>
               </a:ext>
             </a:extLst>
           </p:cNvPr>
@@ -3651,7 +3658,7 @@
           <p:nvPr/>
         </p:nvPicPr>
         <p:blipFill>
-          <a:blip r:embed="rId2">
+          <a:blip r:embed="rId2" cstate="print">
             <a:extLst>
               <a:ext uri="{28A0092B-C50C-407E-A947-70E740481C1C}">
                 <a14:useLocalDpi xmlns:a14="http://schemas.microsoft.com/office/drawing/2010/main" val="0"/>
@@ -3682,6 +3689,13 @@
   <p:clrMapOvr>
     <a:masterClrMapping/>
   </p:clrMapOvr>
+  <p:timing>
+    <p:tnLst>
+      <p:par>
+        <p:cTn id="1" dur="indefinite" restart="never" nodeType="tmRoot"/>
+      </p:par>
+    </p:tnLst>
+  </p:timing>
 </p:sld>
 </file>
 
@@ -3707,7 +3721,7 @@
           <p:cNvPr id="2" name="Titel 1">
             <a:extLst>
               <a:ext uri="{FF2B5EF4-FFF2-40B4-BE49-F238E27FC236}">
-                <a16:creationId xmlns:a16="http://schemas.microsoft.com/office/drawing/2014/main" id="{C3FC66E5-1BC6-478E-AF30-99267E9E9707}"/>
+                <a16:creationId xmlns:a16="http://schemas.microsoft.com/office/drawing/2014/main" xmlns="" id="{C3FC66E5-1BC6-478E-AF30-99267E9E9707}"/>
               </a:ext>
             </a:extLst>
           </p:cNvPr>
@@ -3732,21 +3746,14 @@
       </p:sp>
       <p:pic>
         <p:nvPicPr>
-          <p:cNvPr id="5" name="Grafik 4">
-            <a:hlinkClick r:id="rId2"/>
-            <a:extLst>
-              <a:ext uri="{FF2B5EF4-FFF2-40B4-BE49-F238E27FC236}">
-                <a16:creationId xmlns:a16="http://schemas.microsoft.com/office/drawing/2014/main" id="{C62B9CAB-8D8C-4124-B782-2C2B25AC3E67}"/>
-              </a:ext>
-            </a:extLst>
-          </p:cNvPr>
+          <p:cNvPr id="4" name="Grafik 3"/>
           <p:cNvPicPr>
             <a:picLocks noChangeAspect="1"/>
           </p:cNvPicPr>
           <p:nvPr/>
         </p:nvPicPr>
         <p:blipFill>
-          <a:blip r:embed="rId3">
+          <a:blip r:embed="rId2" cstate="print">
             <a:extLst>
               <a:ext uri="{28A0092B-C50C-407E-A947-70E740481C1C}">
                 <a14:useLocalDpi xmlns:a14="http://schemas.microsoft.com/office/drawing/2010/main" val="0"/>
@@ -3759,8 +3766,68 @@
         </p:blipFill>
         <p:spPr>
           <a:xfrm>
-            <a:off x="4734187" y="2067187"/>
-            <a:ext cx="2723626" cy="2723626"/>
+            <a:off x="551937" y="2047048"/>
+            <a:ext cx="6417274" cy="3609716"/>
+          </a:xfrm>
+          <a:prstGeom prst="rect">
+            <a:avLst/>
+          </a:prstGeom>
+        </p:spPr>
+      </p:pic>
+      <p:pic>
+        <p:nvPicPr>
+          <p:cNvPr id="6" name="Grafik 5"/>
+          <p:cNvPicPr>
+            <a:picLocks noChangeAspect="1"/>
+          </p:cNvPicPr>
+          <p:nvPr/>
+        </p:nvPicPr>
+        <p:blipFill>
+          <a:blip r:embed="rId3" cstate="print">
+            <a:extLst>
+              <a:ext uri="{28A0092B-C50C-407E-A947-70E740481C1C}">
+                <a14:useLocalDpi xmlns:a14="http://schemas.microsoft.com/office/drawing/2010/main" val="0"/>
+              </a:ext>
+            </a:extLst>
+          </a:blip>
+          <a:stretch>
+            <a:fillRect/>
+          </a:stretch>
+        </p:blipFill>
+        <p:spPr>
+          <a:xfrm>
+            <a:off x="7479956" y="1096313"/>
+            <a:ext cx="4400425" cy="2475239"/>
+          </a:xfrm>
+          <a:prstGeom prst="rect">
+            <a:avLst/>
+          </a:prstGeom>
+        </p:spPr>
+      </p:pic>
+      <p:pic>
+        <p:nvPicPr>
+          <p:cNvPr id="7" name="Grafik 6"/>
+          <p:cNvPicPr>
+            <a:picLocks noChangeAspect="1"/>
+          </p:cNvPicPr>
+          <p:nvPr/>
+        </p:nvPicPr>
+        <p:blipFill>
+          <a:blip r:embed="rId4" cstate="print">
+            <a:extLst>
+              <a:ext uri="{28A0092B-C50C-407E-A947-70E740481C1C}">
+                <a14:useLocalDpi xmlns:a14="http://schemas.microsoft.com/office/drawing/2010/main" val="0"/>
+              </a:ext>
+            </a:extLst>
+          </a:blip>
+          <a:stretch>
+            <a:fillRect/>
+          </a:stretch>
+        </p:blipFill>
+        <p:spPr>
+          <a:xfrm>
+            <a:off x="7479955" y="3716981"/>
+            <a:ext cx="4400426" cy="2475241"/>
           </a:xfrm>
           <a:prstGeom prst="rect">
             <a:avLst/>
@@ -3777,6 +3844,13 @@
   <p:clrMapOvr>
     <a:masterClrMapping/>
   </p:clrMapOvr>
+  <p:timing>
+    <p:tnLst>
+      <p:par>
+        <p:cTn id="1" dur="indefinite" restart="never" nodeType="tmRoot"/>
+      </p:par>
+    </p:tnLst>
+  </p:timing>
 </p:sld>
 </file>
 
@@ -3802,7 +3876,7 @@
           <p:cNvPr id="2" name="Titel 1">
             <a:extLst>
               <a:ext uri="{FF2B5EF4-FFF2-40B4-BE49-F238E27FC236}">
-                <a16:creationId xmlns:a16="http://schemas.microsoft.com/office/drawing/2014/main" id="{C3FC66E5-1BC6-478E-AF30-99267E9E9707}"/>
+                <a16:creationId xmlns:a16="http://schemas.microsoft.com/office/drawing/2014/main" xmlns="" id="{C3FC66E5-1BC6-478E-AF30-99267E9E9707}"/>
               </a:ext>
             </a:extLst>
           </p:cNvPr>
@@ -3830,7 +3904,7 @@
           <p:cNvPr id="3" name="Inhaltsplatzhalter 2">
             <a:extLst>
               <a:ext uri="{FF2B5EF4-FFF2-40B4-BE49-F238E27FC236}">
-                <a16:creationId xmlns:a16="http://schemas.microsoft.com/office/drawing/2014/main" id="{F88D185D-F4BA-4E7C-B099-6405FECD2FC8}"/>
+                <a16:creationId xmlns:a16="http://schemas.microsoft.com/office/drawing/2014/main" xmlns="" id="{F88D185D-F4BA-4E7C-B099-6405FECD2FC8}"/>
               </a:ext>
             </a:extLst>
           </p:cNvPr>
@@ -3910,7 +3984,7 @@
           <p:cNvPr id="5" name="Grafik 4">
             <a:extLst>
               <a:ext uri="{FF2B5EF4-FFF2-40B4-BE49-F238E27FC236}">
-                <a16:creationId xmlns:a16="http://schemas.microsoft.com/office/drawing/2014/main" id="{C62B9CAB-8D8C-4124-B782-2C2B25AC3E67}"/>
+                <a16:creationId xmlns:a16="http://schemas.microsoft.com/office/drawing/2014/main" xmlns="" id="{C62B9CAB-8D8C-4124-B782-2C2B25AC3E67}"/>
               </a:ext>
             </a:extLst>
           </p:cNvPr>
@@ -3920,7 +3994,7 @@
           <p:nvPr/>
         </p:nvPicPr>
         <p:blipFill>
-          <a:blip r:embed="rId2">
+          <a:blip r:embed="rId2" cstate="print">
             <a:extLst>
               <a:ext uri="{28A0092B-C50C-407E-A947-70E740481C1C}">
                 <a14:useLocalDpi xmlns:a14="http://schemas.microsoft.com/office/drawing/2010/main" val="0"/>
@@ -3976,7 +4050,7 @@
           <p:cNvPr id="2" name="Titel 1">
             <a:extLst>
               <a:ext uri="{FF2B5EF4-FFF2-40B4-BE49-F238E27FC236}">
-                <a16:creationId xmlns:a16="http://schemas.microsoft.com/office/drawing/2014/main" id="{B2ED9C9A-7703-4338-984B-733796CEEE5E}"/>
+                <a16:creationId xmlns:a16="http://schemas.microsoft.com/office/drawing/2014/main" xmlns="" id="{B2ED9C9A-7703-4338-984B-733796CEEE5E}"/>
               </a:ext>
             </a:extLst>
           </p:cNvPr>
@@ -4013,7 +4087,7 @@
           <p:cNvPr id="3" name="Inhaltsplatzhalter 2">
             <a:extLst>
               <a:ext uri="{FF2B5EF4-FFF2-40B4-BE49-F238E27FC236}">
-                <a16:creationId xmlns:a16="http://schemas.microsoft.com/office/drawing/2014/main" id="{0EF665D7-8943-4D4B-8CA0-99E7B5FAD9D7}"/>
+                <a16:creationId xmlns:a16="http://schemas.microsoft.com/office/drawing/2014/main" xmlns="" id="{0EF665D7-8943-4D4B-8CA0-99E7B5FAD9D7}"/>
               </a:ext>
             </a:extLst>
           </p:cNvPr>
@@ -4078,7 +4152,7 @@
           <p:cNvPr id="5" name="Grafik 4">
             <a:extLst>
               <a:ext uri="{FF2B5EF4-FFF2-40B4-BE49-F238E27FC236}">
-                <a16:creationId xmlns:a16="http://schemas.microsoft.com/office/drawing/2014/main" id="{A8AA99C3-AB38-4D88-A92A-AD16DD4EECB5}"/>
+                <a16:creationId xmlns:a16="http://schemas.microsoft.com/office/drawing/2014/main" xmlns="" id="{A8AA99C3-AB38-4D88-A92A-AD16DD4EECB5}"/>
               </a:ext>
             </a:extLst>
           </p:cNvPr>
@@ -4088,7 +4162,7 @@
           <p:nvPr/>
         </p:nvPicPr>
         <p:blipFill>
-          <a:blip r:embed="rId2">
+          <a:blip r:embed="rId2" cstate="print">
             <a:extLst>
               <a:ext uri="{28A0092B-C50C-407E-A947-70E740481C1C}">
                 <a14:useLocalDpi xmlns:a14="http://schemas.microsoft.com/office/drawing/2010/main" val="0"/>
@@ -4144,7 +4218,7 @@
           <p:cNvPr id="2" name="Titel 1">
             <a:extLst>
               <a:ext uri="{FF2B5EF4-FFF2-40B4-BE49-F238E27FC236}">
-                <a16:creationId xmlns:a16="http://schemas.microsoft.com/office/drawing/2014/main" id="{D58C6BB3-C481-4786-A175-DFC732F45489}"/>
+                <a16:creationId xmlns:a16="http://schemas.microsoft.com/office/drawing/2014/main" xmlns="" id="{D58C6BB3-C481-4786-A175-DFC732F45489}"/>
               </a:ext>
             </a:extLst>
           </p:cNvPr>
@@ -4172,7 +4246,7 @@
           <p:cNvPr id="2050" name="Picture 2" descr="Berater Mit Fragezeichen - Consult-SK GmbH">
             <a:extLst>
               <a:ext uri="{FF2B5EF4-FFF2-40B4-BE49-F238E27FC236}">
-                <a16:creationId xmlns:a16="http://schemas.microsoft.com/office/drawing/2014/main" id="{67832CDE-1914-4365-8437-92D6CE119EA4}"/>
+                <a16:creationId xmlns:a16="http://schemas.microsoft.com/office/drawing/2014/main" xmlns="" id="{67832CDE-1914-4365-8437-92D6CE119EA4}"/>
               </a:ext>
             </a:extLst>
           </p:cNvPr>
@@ -4221,7 +4295,7 @@
           <p:cNvPr id="5" name="Grafik 4">
             <a:extLst>
               <a:ext uri="{FF2B5EF4-FFF2-40B4-BE49-F238E27FC236}">
-                <a16:creationId xmlns:a16="http://schemas.microsoft.com/office/drawing/2014/main" id="{BCD7C808-1A36-48F8-B970-44197C049034}"/>
+                <a16:creationId xmlns:a16="http://schemas.microsoft.com/office/drawing/2014/main" xmlns="" id="{BCD7C808-1A36-48F8-B970-44197C049034}"/>
               </a:ext>
             </a:extLst>
           </p:cNvPr>
@@ -4231,7 +4305,7 @@
           <p:nvPr/>
         </p:nvPicPr>
         <p:blipFill>
-          <a:blip r:embed="rId3">
+          <a:blip r:embed="rId3" cstate="print">
             <a:extLst>
               <a:ext uri="{28A0092B-C50C-407E-A947-70E740481C1C}">
                 <a14:useLocalDpi xmlns:a14="http://schemas.microsoft.com/office/drawing/2010/main" val="0"/>

</xml_diff>